<commit_message>
update causal model fig
</commit_message>
<xml_diff>
--- a/plots/causal_model/High Level Causal Model.pptx
+++ b/plots/causal_model/High Level Causal Model.pptx
@@ -7464,7 +7464,7 @@
           <a:noFill/>
           <a:ln w="28575" cap="flat" cmpd="sng">
             <a:solidFill>
-              <a:srgbClr val="539FA7"/>
+              <a:srgbClr val="6D9EEB"/>
             </a:solidFill>
             <a:prstDash val="solid"/>
             <a:round/>
@@ -7751,421 +7751,526 @@
           </a:ln>
         </p:spPr>
       </p:cxnSp>
-      <p:sp>
-        <p:nvSpPr>
-          <p:cNvPr id="1097" name="Google Shape;1097;p27"/>
-          <p:cNvSpPr/>
+      <p:grpSp>
+        <p:nvGrpSpPr>
+          <p:cNvPr id="6" name="Group 5">
+            <a:extLst>
+              <a:ext uri="{FF2B5EF4-FFF2-40B4-BE49-F238E27FC236}">
+                <a16:creationId xmlns:a16="http://schemas.microsoft.com/office/drawing/2014/main" id="{969D4048-16FF-604F-9171-B1B75F889CC0}"/>
+              </a:ext>
+            </a:extLst>
+          </p:cNvPr>
+          <p:cNvGrpSpPr/>
           <p:nvPr/>
-        </p:nvSpPr>
-        <p:spPr>
+        </p:nvGrpSpPr>
+        <p:grpSpPr>
           <a:xfrm>
-            <a:off x="-147944" y="911715"/>
+            <a:off x="-147944" y="1007788"/>
             <a:ext cx="480000" cy="157500"/>
-          </a:xfrm>
-          <a:prstGeom prst="roundRect">
-            <a:avLst>
-              <a:gd name="adj" fmla="val 16667"/>
-            </a:avLst>
-          </a:prstGeom>
-          <a:noFill/>
-          <a:ln>
+            <a:chOff x="-147944" y="935826"/>
+            <a:chExt cx="480000" cy="157500"/>
+          </a:xfrm>
+        </p:grpSpPr>
+        <p:sp>
+          <p:nvSpPr>
+            <p:cNvPr id="1097" name="Google Shape;1097;p27"/>
+            <p:cNvSpPr/>
+            <p:nvPr/>
+          </p:nvSpPr>
+          <p:spPr>
+            <a:xfrm>
+              <a:off x="-147944" y="935826"/>
+              <a:ext cx="480000" cy="157500"/>
+            </a:xfrm>
+            <a:prstGeom prst="roundRect">
+              <a:avLst>
+                <a:gd name="adj" fmla="val 16667"/>
+              </a:avLst>
+            </a:prstGeom>
             <a:noFill/>
-          </a:ln>
-        </p:spPr>
-        <p:txBody>
-          <a:bodyPr spcFirstLastPara="1" wrap="square" lIns="0" tIns="91425" rIns="0" bIns="91425" anchor="ctr" anchorCtr="0">
-            <a:noAutofit/>
-          </a:bodyPr>
-          <a:lstStyle/>
-          <a:p>
-            <a:pPr marL="0" marR="0" lvl="0" indent="0" algn="ctr" rtl="0">
-              <a:lnSpc>
-                <a:spcPct val="100000"/>
-              </a:lnSpc>
-              <a:spcBef>
-                <a:spcPts val="0"/>
-              </a:spcBef>
-              <a:spcAft>
-                <a:spcPts val="0"/>
-              </a:spcAft>
-              <a:buNone/>
-            </a:pPr>
-            <a:r>
-              <a:rPr lang="en" sz="1200" dirty="0">
+            <a:ln>
+              <a:noFill/>
+            </a:ln>
+          </p:spPr>
+          <p:txBody>
+            <a:bodyPr spcFirstLastPara="1" wrap="square" lIns="0" tIns="91425" rIns="0" bIns="91425" anchor="ctr" anchorCtr="0">
+              <a:noAutofit/>
+            </a:bodyPr>
+            <a:lstStyle/>
+            <a:p>
+              <a:pPr marL="0" marR="0" lvl="0" indent="0" algn="ctr" rtl="0">
+                <a:lnSpc>
+                  <a:spcPct val="100000"/>
+                </a:lnSpc>
+                <a:spcBef>
+                  <a:spcPts val="0"/>
+                </a:spcBef>
+                <a:spcAft>
+                  <a:spcPts val="0"/>
+                </a:spcAft>
+                <a:buNone/>
+              </a:pPr>
+              <a:r>
+                <a:rPr lang="en" sz="1200" dirty="0">
+                  <a:latin typeface="Avenir Book" panose="02000503020000020003" pitchFamily="2" charset="0"/>
+                  <a:ea typeface="Times New Roman"/>
+                  <a:cs typeface="Times New Roman"/>
+                  <a:sym typeface="Times New Roman"/>
+                </a:rPr>
+                <a:t>50</a:t>
+              </a:r>
+              <a:endParaRPr sz="1200" dirty="0">
                 <a:latin typeface="Avenir Book" panose="02000503020000020003" pitchFamily="2" charset="0"/>
                 <a:ea typeface="Times New Roman"/>
                 <a:cs typeface="Times New Roman"/>
                 <a:sym typeface="Times New Roman"/>
-              </a:rPr>
-              <a:t>50</a:t>
-            </a:r>
-            <a:endParaRPr sz="1200" dirty="0">
-              <a:latin typeface="Avenir Book" panose="02000503020000020003" pitchFamily="2" charset="0"/>
-              <a:ea typeface="Times New Roman"/>
-              <a:cs typeface="Times New Roman"/>
-              <a:sym typeface="Times New Roman"/>
-            </a:endParaRPr>
-          </a:p>
-        </p:txBody>
-      </p:sp>
-      <p:cxnSp>
-        <p:nvCxnSpPr>
-          <p:cNvPr id="1098" name="Google Shape;1098;p27"/>
-          <p:cNvCxnSpPr/>
+              </a:endParaRPr>
+            </a:p>
+          </p:txBody>
+        </p:sp>
+        <p:cxnSp>
+          <p:nvCxnSpPr>
+            <p:cNvPr id="1098" name="Google Shape;1098;p27"/>
+            <p:cNvCxnSpPr/>
+            <p:nvPr/>
+          </p:nvCxnSpPr>
+          <p:spPr>
+            <a:xfrm>
+              <a:off x="214818" y="1008650"/>
+              <a:ext cx="78600" cy="0"/>
+            </a:xfrm>
+            <a:prstGeom prst="straightConnector1">
+              <a:avLst/>
+            </a:prstGeom>
+            <a:noFill/>
+            <a:ln w="9525" cap="flat" cmpd="sng">
+              <a:solidFill>
+                <a:schemeClr val="dk2"/>
+              </a:solidFill>
+              <a:prstDash val="solid"/>
+              <a:round/>
+              <a:headEnd type="none" w="med" len="med"/>
+              <a:tailEnd type="none" w="med" len="med"/>
+            </a:ln>
+          </p:spPr>
+        </p:cxnSp>
+      </p:grpSp>
+      <p:grpSp>
+        <p:nvGrpSpPr>
+          <p:cNvPr id="7" name="Group 6">
+            <a:extLst>
+              <a:ext uri="{FF2B5EF4-FFF2-40B4-BE49-F238E27FC236}">
+                <a16:creationId xmlns:a16="http://schemas.microsoft.com/office/drawing/2014/main" id="{13EE3245-360E-414A-9AC6-E5CBBB1A2B5E}"/>
+              </a:ext>
+            </a:extLst>
+          </p:cNvPr>
+          <p:cNvGrpSpPr/>
           <p:nvPr/>
-        </p:nvCxnSpPr>
-        <p:spPr>
+        </p:nvGrpSpPr>
+        <p:grpSpPr>
           <a:xfrm>
-            <a:off x="214818" y="1008650"/>
-            <a:ext cx="78600" cy="0"/>
-          </a:xfrm>
-          <a:prstGeom prst="straightConnector1">
-            <a:avLst/>
-          </a:prstGeom>
-          <a:noFill/>
-          <a:ln w="9525" cap="flat" cmpd="sng">
-            <a:solidFill>
-              <a:schemeClr val="dk2"/>
-            </a:solidFill>
-            <a:prstDash val="solid"/>
-            <a:round/>
-            <a:headEnd type="none" w="med" len="med"/>
-            <a:tailEnd type="none" w="med" len="med"/>
-          </a:ln>
-        </p:spPr>
-      </p:cxnSp>
-      <p:sp>
-        <p:nvSpPr>
-          <p:cNvPr id="1099" name="Google Shape;1099;p27"/>
-          <p:cNvSpPr/>
-          <p:nvPr/>
-        </p:nvSpPr>
-        <p:spPr>
-          <a:xfrm>
-            <a:off x="-147944" y="1597255"/>
+            <a:off x="-147944" y="1719390"/>
             <a:ext cx="480000" cy="157500"/>
-          </a:xfrm>
-          <a:prstGeom prst="roundRect">
-            <a:avLst>
-              <a:gd name="adj" fmla="val 16667"/>
-            </a:avLst>
-          </a:prstGeom>
-          <a:noFill/>
-          <a:ln>
+            <a:chOff x="-147944" y="1597255"/>
+            <a:chExt cx="480000" cy="157500"/>
+          </a:xfrm>
+        </p:grpSpPr>
+        <p:sp>
+          <p:nvSpPr>
+            <p:cNvPr id="1099" name="Google Shape;1099;p27"/>
+            <p:cNvSpPr/>
+            <p:nvPr/>
+          </p:nvSpPr>
+          <p:spPr>
+            <a:xfrm>
+              <a:off x="-147944" y="1597255"/>
+              <a:ext cx="480000" cy="157500"/>
+            </a:xfrm>
+            <a:prstGeom prst="roundRect">
+              <a:avLst>
+                <a:gd name="adj" fmla="val 16667"/>
+              </a:avLst>
+            </a:prstGeom>
             <a:noFill/>
-          </a:ln>
-        </p:spPr>
-        <p:txBody>
-          <a:bodyPr spcFirstLastPara="1" wrap="square" lIns="0" tIns="91425" rIns="0" bIns="91425" anchor="ctr" anchorCtr="0">
-            <a:noAutofit/>
-          </a:bodyPr>
-          <a:lstStyle/>
-          <a:p>
-            <a:pPr marL="0" marR="0" lvl="0" indent="0" algn="ctr" rtl="0">
-              <a:lnSpc>
-                <a:spcPct val="100000"/>
-              </a:lnSpc>
-              <a:spcBef>
-                <a:spcPts val="0"/>
-              </a:spcBef>
-              <a:spcAft>
-                <a:spcPts val="0"/>
-              </a:spcAft>
-              <a:buNone/>
-            </a:pPr>
-            <a:r>
-              <a:rPr lang="en" sz="1200">
+            <a:ln>
+              <a:noFill/>
+            </a:ln>
+          </p:spPr>
+          <p:txBody>
+            <a:bodyPr spcFirstLastPara="1" wrap="square" lIns="0" tIns="91425" rIns="0" bIns="91425" anchor="ctr" anchorCtr="0">
+              <a:noAutofit/>
+            </a:bodyPr>
+            <a:lstStyle/>
+            <a:p>
+              <a:pPr marL="0" marR="0" lvl="0" indent="0" algn="ctr" rtl="0">
+                <a:lnSpc>
+                  <a:spcPct val="100000"/>
+                </a:lnSpc>
+                <a:spcBef>
+                  <a:spcPts val="0"/>
+                </a:spcBef>
+                <a:spcAft>
+                  <a:spcPts val="0"/>
+                </a:spcAft>
+                <a:buNone/>
+              </a:pPr>
+              <a:r>
+                <a:rPr lang="en" sz="1200">
+                  <a:latin typeface="Avenir Book" panose="02000503020000020003" pitchFamily="2" charset="0"/>
+                  <a:ea typeface="Times New Roman"/>
+                  <a:cs typeface="Times New Roman"/>
+                  <a:sym typeface="Times New Roman"/>
+                </a:rPr>
+                <a:t>40</a:t>
+              </a:r>
+              <a:endParaRPr sz="1200">
                 <a:latin typeface="Avenir Book" panose="02000503020000020003" pitchFamily="2" charset="0"/>
                 <a:ea typeface="Times New Roman"/>
                 <a:cs typeface="Times New Roman"/>
                 <a:sym typeface="Times New Roman"/>
-              </a:rPr>
-              <a:t>40</a:t>
-            </a:r>
-            <a:endParaRPr sz="1200">
-              <a:latin typeface="Avenir Book" panose="02000503020000020003" pitchFamily="2" charset="0"/>
-              <a:ea typeface="Times New Roman"/>
-              <a:cs typeface="Times New Roman"/>
-              <a:sym typeface="Times New Roman"/>
-            </a:endParaRPr>
-          </a:p>
-        </p:txBody>
-      </p:sp>
-      <p:cxnSp>
-        <p:nvCxnSpPr>
-          <p:cNvPr id="1100" name="Google Shape;1100;p27"/>
-          <p:cNvCxnSpPr/>
+              </a:endParaRPr>
+            </a:p>
+          </p:txBody>
+        </p:sp>
+        <p:cxnSp>
+          <p:nvCxnSpPr>
+            <p:cNvPr id="1100" name="Google Shape;1100;p27"/>
+            <p:cNvCxnSpPr/>
+            <p:nvPr/>
+          </p:nvCxnSpPr>
+          <p:spPr>
+            <a:xfrm>
+              <a:off x="214818" y="1676000"/>
+              <a:ext cx="78600" cy="0"/>
+            </a:xfrm>
+            <a:prstGeom prst="straightConnector1">
+              <a:avLst/>
+            </a:prstGeom>
+            <a:noFill/>
+            <a:ln w="9525" cap="flat" cmpd="sng">
+              <a:solidFill>
+                <a:schemeClr val="dk2"/>
+              </a:solidFill>
+              <a:prstDash val="solid"/>
+              <a:round/>
+              <a:headEnd type="none" w="med" len="med"/>
+              <a:tailEnd type="none" w="med" len="med"/>
+            </a:ln>
+          </p:spPr>
+        </p:cxnSp>
+      </p:grpSp>
+      <p:grpSp>
+        <p:nvGrpSpPr>
+          <p:cNvPr id="9" name="Group 8">
+            <a:extLst>
+              <a:ext uri="{FF2B5EF4-FFF2-40B4-BE49-F238E27FC236}">
+                <a16:creationId xmlns:a16="http://schemas.microsoft.com/office/drawing/2014/main" id="{361F28AC-8216-0245-9648-B80B341C0489}"/>
+              </a:ext>
+            </a:extLst>
+          </p:cNvPr>
+          <p:cNvGrpSpPr/>
           <p:nvPr/>
-        </p:nvCxnSpPr>
-        <p:spPr>
+        </p:nvGrpSpPr>
+        <p:grpSpPr>
           <a:xfrm>
-            <a:off x="214818" y="1676000"/>
-            <a:ext cx="78600" cy="0"/>
-          </a:xfrm>
-          <a:prstGeom prst="straightConnector1">
-            <a:avLst/>
-          </a:prstGeom>
-          <a:noFill/>
-          <a:ln w="9525" cap="flat" cmpd="sng">
-            <a:solidFill>
-              <a:schemeClr val="dk2"/>
-            </a:solidFill>
-            <a:prstDash val="solid"/>
-            <a:round/>
-            <a:headEnd type="none" w="med" len="med"/>
-            <a:tailEnd type="none" w="med" len="med"/>
-          </a:ln>
-        </p:spPr>
-      </p:cxnSp>
-      <p:sp>
-        <p:nvSpPr>
-          <p:cNvPr id="1101" name="Google Shape;1101;p27"/>
-          <p:cNvSpPr/>
-          <p:nvPr/>
-        </p:nvSpPr>
-        <p:spPr>
-          <a:xfrm>
-            <a:off x="-147944" y="2358995"/>
+            <a:off x="-147944" y="2430992"/>
             <a:ext cx="480000" cy="157500"/>
-          </a:xfrm>
-          <a:prstGeom prst="roundRect">
-            <a:avLst>
-              <a:gd name="adj" fmla="val 16667"/>
-            </a:avLst>
-          </a:prstGeom>
-          <a:noFill/>
-          <a:ln>
+            <a:chOff x="-147944" y="2358995"/>
+            <a:chExt cx="480000" cy="157500"/>
+          </a:xfrm>
+        </p:grpSpPr>
+        <p:sp>
+          <p:nvSpPr>
+            <p:cNvPr id="1101" name="Google Shape;1101;p27"/>
+            <p:cNvSpPr/>
+            <p:nvPr/>
+          </p:nvSpPr>
+          <p:spPr>
+            <a:xfrm>
+              <a:off x="-147944" y="2358995"/>
+              <a:ext cx="480000" cy="157500"/>
+            </a:xfrm>
+            <a:prstGeom prst="roundRect">
+              <a:avLst>
+                <a:gd name="adj" fmla="val 16667"/>
+              </a:avLst>
+            </a:prstGeom>
             <a:noFill/>
-          </a:ln>
-        </p:spPr>
-        <p:txBody>
-          <a:bodyPr spcFirstLastPara="1" wrap="square" lIns="0" tIns="91425" rIns="0" bIns="91425" anchor="ctr" anchorCtr="0">
-            <a:noAutofit/>
-          </a:bodyPr>
-          <a:lstStyle/>
-          <a:p>
-            <a:pPr marL="0" marR="0" lvl="0" indent="0" algn="ctr" rtl="0">
-              <a:lnSpc>
-                <a:spcPct val="100000"/>
-              </a:lnSpc>
-              <a:spcBef>
-                <a:spcPts val="0"/>
-              </a:spcBef>
-              <a:spcAft>
-                <a:spcPts val="0"/>
-              </a:spcAft>
-              <a:buNone/>
-            </a:pPr>
-            <a:r>
-              <a:rPr lang="en" sz="1200">
+            <a:ln>
+              <a:noFill/>
+            </a:ln>
+          </p:spPr>
+          <p:txBody>
+            <a:bodyPr spcFirstLastPara="1" wrap="square" lIns="0" tIns="91425" rIns="0" bIns="91425" anchor="ctr" anchorCtr="0">
+              <a:noAutofit/>
+            </a:bodyPr>
+            <a:lstStyle/>
+            <a:p>
+              <a:pPr marL="0" marR="0" lvl="0" indent="0" algn="ctr" rtl="0">
+                <a:lnSpc>
+                  <a:spcPct val="100000"/>
+                </a:lnSpc>
+                <a:spcBef>
+                  <a:spcPts val="0"/>
+                </a:spcBef>
+                <a:spcAft>
+                  <a:spcPts val="0"/>
+                </a:spcAft>
+                <a:buNone/>
+              </a:pPr>
+              <a:r>
+                <a:rPr lang="en" sz="1200" dirty="0">
+                  <a:latin typeface="Avenir Book" panose="02000503020000020003" pitchFamily="2" charset="0"/>
+                  <a:ea typeface="Times New Roman"/>
+                  <a:cs typeface="Times New Roman"/>
+                  <a:sym typeface="Times New Roman"/>
+                </a:rPr>
+                <a:t>30</a:t>
+              </a:r>
+              <a:endParaRPr sz="1200" dirty="0">
                 <a:latin typeface="Avenir Book" panose="02000503020000020003" pitchFamily="2" charset="0"/>
                 <a:ea typeface="Times New Roman"/>
                 <a:cs typeface="Times New Roman"/>
                 <a:sym typeface="Times New Roman"/>
-              </a:rPr>
-              <a:t>30</a:t>
-            </a:r>
-            <a:endParaRPr sz="1200">
-              <a:latin typeface="Avenir Book" panose="02000503020000020003" pitchFamily="2" charset="0"/>
-              <a:ea typeface="Times New Roman"/>
-              <a:cs typeface="Times New Roman"/>
-              <a:sym typeface="Times New Roman"/>
-            </a:endParaRPr>
-          </a:p>
-        </p:txBody>
-      </p:sp>
-      <p:cxnSp>
-        <p:nvCxnSpPr>
-          <p:cNvPr id="1102" name="Google Shape;1102;p27"/>
-          <p:cNvCxnSpPr/>
+              </a:endParaRPr>
+            </a:p>
+          </p:txBody>
+        </p:sp>
+        <p:cxnSp>
+          <p:nvCxnSpPr>
+            <p:cNvPr id="1102" name="Google Shape;1102;p27"/>
+            <p:cNvCxnSpPr/>
+            <p:nvPr/>
+          </p:nvCxnSpPr>
+          <p:spPr>
+            <a:xfrm>
+              <a:off x="214818" y="2437750"/>
+              <a:ext cx="78600" cy="0"/>
+            </a:xfrm>
+            <a:prstGeom prst="straightConnector1">
+              <a:avLst/>
+            </a:prstGeom>
+            <a:noFill/>
+            <a:ln w="9525" cap="flat" cmpd="sng">
+              <a:solidFill>
+                <a:schemeClr val="dk2"/>
+              </a:solidFill>
+              <a:prstDash val="solid"/>
+              <a:round/>
+              <a:headEnd type="none" w="med" len="med"/>
+              <a:tailEnd type="none" w="med" len="med"/>
+            </a:ln>
+          </p:spPr>
+        </p:cxnSp>
+      </p:grpSp>
+      <p:grpSp>
+        <p:nvGrpSpPr>
+          <p:cNvPr id="10" name="Group 9">
+            <a:extLst>
+              <a:ext uri="{FF2B5EF4-FFF2-40B4-BE49-F238E27FC236}">
+                <a16:creationId xmlns:a16="http://schemas.microsoft.com/office/drawing/2014/main" id="{FFBCB560-EEE3-3848-896C-A1A0ADA3425B}"/>
+              </a:ext>
+            </a:extLst>
+          </p:cNvPr>
+          <p:cNvGrpSpPr/>
           <p:nvPr/>
-        </p:nvCxnSpPr>
-        <p:spPr>
+        </p:nvGrpSpPr>
+        <p:grpSpPr>
           <a:xfrm>
-            <a:off x="214818" y="2437750"/>
-            <a:ext cx="78600" cy="0"/>
-          </a:xfrm>
-          <a:prstGeom prst="straightConnector1">
-            <a:avLst/>
-          </a:prstGeom>
-          <a:noFill/>
-          <a:ln w="9525" cap="flat" cmpd="sng">
-            <a:solidFill>
-              <a:schemeClr val="dk2"/>
-            </a:solidFill>
-            <a:prstDash val="solid"/>
-            <a:round/>
-            <a:headEnd type="none" w="med" len="med"/>
-            <a:tailEnd type="none" w="med" len="med"/>
-          </a:ln>
-        </p:spPr>
-      </p:cxnSp>
-      <p:sp>
-        <p:nvSpPr>
-          <p:cNvPr id="1103" name="Google Shape;1103;p27"/>
-          <p:cNvSpPr/>
-          <p:nvPr/>
-        </p:nvSpPr>
-        <p:spPr>
-          <a:xfrm>
-            <a:off x="-147944" y="3120735"/>
+            <a:off x="-147944" y="3142594"/>
             <a:ext cx="480000" cy="157500"/>
-          </a:xfrm>
-          <a:prstGeom prst="roundRect">
-            <a:avLst>
-              <a:gd name="adj" fmla="val 16667"/>
-            </a:avLst>
-          </a:prstGeom>
-          <a:noFill/>
-          <a:ln>
+            <a:chOff x="-147944" y="3120735"/>
+            <a:chExt cx="480000" cy="157500"/>
+          </a:xfrm>
+        </p:grpSpPr>
+        <p:sp>
+          <p:nvSpPr>
+            <p:cNvPr id="1103" name="Google Shape;1103;p27"/>
+            <p:cNvSpPr/>
+            <p:nvPr/>
+          </p:nvSpPr>
+          <p:spPr>
+            <a:xfrm>
+              <a:off x="-147944" y="3120735"/>
+              <a:ext cx="480000" cy="157500"/>
+            </a:xfrm>
+            <a:prstGeom prst="roundRect">
+              <a:avLst>
+                <a:gd name="adj" fmla="val 16667"/>
+              </a:avLst>
+            </a:prstGeom>
             <a:noFill/>
-          </a:ln>
-        </p:spPr>
-        <p:txBody>
-          <a:bodyPr spcFirstLastPara="1" wrap="square" lIns="0" tIns="91425" rIns="0" bIns="91425" anchor="ctr" anchorCtr="0">
-            <a:noAutofit/>
-          </a:bodyPr>
-          <a:lstStyle/>
-          <a:p>
-            <a:pPr marL="0" marR="0" lvl="0" indent="0" algn="ctr" rtl="0">
-              <a:lnSpc>
-                <a:spcPct val="100000"/>
-              </a:lnSpc>
-              <a:spcBef>
-                <a:spcPts val="0"/>
-              </a:spcBef>
-              <a:spcAft>
-                <a:spcPts val="0"/>
-              </a:spcAft>
-              <a:buNone/>
-            </a:pPr>
-            <a:r>
-              <a:rPr lang="en" sz="1200">
+            <a:ln>
+              <a:noFill/>
+            </a:ln>
+          </p:spPr>
+          <p:txBody>
+            <a:bodyPr spcFirstLastPara="1" wrap="square" lIns="0" tIns="91425" rIns="0" bIns="91425" anchor="ctr" anchorCtr="0">
+              <a:noAutofit/>
+            </a:bodyPr>
+            <a:lstStyle/>
+            <a:p>
+              <a:pPr marL="0" marR="0" lvl="0" indent="0" algn="ctr" rtl="0">
+                <a:lnSpc>
+                  <a:spcPct val="100000"/>
+                </a:lnSpc>
+                <a:spcBef>
+                  <a:spcPts val="0"/>
+                </a:spcBef>
+                <a:spcAft>
+                  <a:spcPts val="0"/>
+                </a:spcAft>
+                <a:buNone/>
+              </a:pPr>
+              <a:r>
+                <a:rPr lang="en" sz="1200">
+                  <a:latin typeface="Avenir Book" panose="02000503020000020003" pitchFamily="2" charset="0"/>
+                  <a:ea typeface="Times New Roman"/>
+                  <a:cs typeface="Times New Roman"/>
+                  <a:sym typeface="Times New Roman"/>
+                </a:rPr>
+                <a:t>20</a:t>
+              </a:r>
+              <a:endParaRPr sz="1200">
                 <a:latin typeface="Avenir Book" panose="02000503020000020003" pitchFamily="2" charset="0"/>
                 <a:ea typeface="Times New Roman"/>
                 <a:cs typeface="Times New Roman"/>
                 <a:sym typeface="Times New Roman"/>
-              </a:rPr>
-              <a:t>20</a:t>
-            </a:r>
-            <a:endParaRPr sz="1200">
-              <a:latin typeface="Avenir Book" panose="02000503020000020003" pitchFamily="2" charset="0"/>
-              <a:ea typeface="Times New Roman"/>
-              <a:cs typeface="Times New Roman"/>
-              <a:sym typeface="Times New Roman"/>
-            </a:endParaRPr>
-          </a:p>
-        </p:txBody>
-      </p:sp>
-      <p:cxnSp>
-        <p:nvCxnSpPr>
-          <p:cNvPr id="1104" name="Google Shape;1104;p27"/>
-          <p:cNvCxnSpPr/>
+              </a:endParaRPr>
+            </a:p>
+          </p:txBody>
+        </p:sp>
+        <p:cxnSp>
+          <p:nvCxnSpPr>
+            <p:cNvPr id="1104" name="Google Shape;1104;p27"/>
+            <p:cNvCxnSpPr/>
+            <p:nvPr/>
+          </p:nvCxnSpPr>
+          <p:spPr>
+            <a:xfrm>
+              <a:off x="214818" y="3199475"/>
+              <a:ext cx="78600" cy="0"/>
+            </a:xfrm>
+            <a:prstGeom prst="straightConnector1">
+              <a:avLst/>
+            </a:prstGeom>
+            <a:noFill/>
+            <a:ln w="9525" cap="flat" cmpd="sng">
+              <a:solidFill>
+                <a:schemeClr val="dk2"/>
+              </a:solidFill>
+              <a:prstDash val="solid"/>
+              <a:round/>
+              <a:headEnd type="none" w="med" len="med"/>
+              <a:tailEnd type="none" w="med" len="med"/>
+            </a:ln>
+          </p:spPr>
+        </p:cxnSp>
+      </p:grpSp>
+      <p:grpSp>
+        <p:nvGrpSpPr>
+          <p:cNvPr id="11" name="Group 10">
+            <a:extLst>
+              <a:ext uri="{FF2B5EF4-FFF2-40B4-BE49-F238E27FC236}">
+                <a16:creationId xmlns:a16="http://schemas.microsoft.com/office/drawing/2014/main" id="{B1795BC2-3BA5-F94D-9912-1AA9D5CA487F}"/>
+              </a:ext>
+            </a:extLst>
+          </p:cNvPr>
+          <p:cNvGrpSpPr/>
           <p:nvPr/>
-        </p:nvCxnSpPr>
-        <p:spPr>
+        </p:nvGrpSpPr>
+        <p:grpSpPr>
           <a:xfrm>
-            <a:off x="214818" y="3199475"/>
-            <a:ext cx="78600" cy="0"/>
-          </a:xfrm>
-          <a:prstGeom prst="straightConnector1">
-            <a:avLst/>
-          </a:prstGeom>
-          <a:noFill/>
-          <a:ln w="9525" cap="flat" cmpd="sng">
-            <a:solidFill>
-              <a:schemeClr val="dk2"/>
-            </a:solidFill>
-            <a:prstDash val="solid"/>
-            <a:round/>
-            <a:headEnd type="none" w="med" len="med"/>
-            <a:tailEnd type="none" w="med" len="med"/>
-          </a:ln>
-        </p:spPr>
-      </p:cxnSp>
-      <p:sp>
-        <p:nvSpPr>
-          <p:cNvPr id="1105" name="Google Shape;1105;p27"/>
-          <p:cNvSpPr/>
-          <p:nvPr/>
-        </p:nvSpPr>
-        <p:spPr>
-          <a:xfrm>
-            <a:off x="-147944" y="3882475"/>
+            <a:off x="-147944" y="3854194"/>
             <a:ext cx="480000" cy="157500"/>
-          </a:xfrm>
-          <a:prstGeom prst="roundRect">
-            <a:avLst>
-              <a:gd name="adj" fmla="val 16667"/>
-            </a:avLst>
-          </a:prstGeom>
-          <a:noFill/>
-          <a:ln>
+            <a:chOff x="-147944" y="3882475"/>
+            <a:chExt cx="480000" cy="157500"/>
+          </a:xfrm>
+        </p:grpSpPr>
+        <p:sp>
+          <p:nvSpPr>
+            <p:cNvPr id="1105" name="Google Shape;1105;p27"/>
+            <p:cNvSpPr/>
+            <p:nvPr/>
+          </p:nvSpPr>
+          <p:spPr>
+            <a:xfrm>
+              <a:off x="-147944" y="3882475"/>
+              <a:ext cx="480000" cy="157500"/>
+            </a:xfrm>
+            <a:prstGeom prst="roundRect">
+              <a:avLst>
+                <a:gd name="adj" fmla="val 16667"/>
+              </a:avLst>
+            </a:prstGeom>
             <a:noFill/>
-          </a:ln>
-        </p:spPr>
-        <p:txBody>
-          <a:bodyPr spcFirstLastPara="1" wrap="square" lIns="0" tIns="91425" rIns="0" bIns="91425" anchor="ctr" anchorCtr="0">
-            <a:noAutofit/>
-          </a:bodyPr>
-          <a:lstStyle/>
-          <a:p>
-            <a:pPr marL="0" marR="0" lvl="0" indent="0" algn="ctr" rtl="0">
-              <a:lnSpc>
-                <a:spcPct val="100000"/>
-              </a:lnSpc>
-              <a:spcBef>
-                <a:spcPts val="0"/>
-              </a:spcBef>
-              <a:spcAft>
-                <a:spcPts val="0"/>
-              </a:spcAft>
-              <a:buNone/>
-            </a:pPr>
-            <a:r>
-              <a:rPr lang="en" sz="1200">
+            <a:ln>
+              <a:noFill/>
+            </a:ln>
+          </p:spPr>
+          <p:txBody>
+            <a:bodyPr spcFirstLastPara="1" wrap="square" lIns="0" tIns="91425" rIns="0" bIns="91425" anchor="ctr" anchorCtr="0">
+              <a:noAutofit/>
+            </a:bodyPr>
+            <a:lstStyle/>
+            <a:p>
+              <a:pPr marL="0" marR="0" lvl="0" indent="0" algn="ctr" rtl="0">
+                <a:lnSpc>
+                  <a:spcPct val="100000"/>
+                </a:lnSpc>
+                <a:spcBef>
+                  <a:spcPts val="0"/>
+                </a:spcBef>
+                <a:spcAft>
+                  <a:spcPts val="0"/>
+                </a:spcAft>
+                <a:buNone/>
+              </a:pPr>
+              <a:r>
+                <a:rPr lang="en" sz="1200">
+                  <a:latin typeface="Avenir Book" panose="02000503020000020003" pitchFamily="2" charset="0"/>
+                  <a:ea typeface="Times New Roman"/>
+                  <a:cs typeface="Times New Roman"/>
+                  <a:sym typeface="Times New Roman"/>
+                </a:rPr>
+                <a:t>10</a:t>
+              </a:r>
+              <a:endParaRPr sz="1200">
                 <a:latin typeface="Avenir Book" panose="02000503020000020003" pitchFamily="2" charset="0"/>
                 <a:ea typeface="Times New Roman"/>
                 <a:cs typeface="Times New Roman"/>
                 <a:sym typeface="Times New Roman"/>
-              </a:rPr>
-              <a:t>10</a:t>
-            </a:r>
-            <a:endParaRPr sz="1200">
-              <a:latin typeface="Avenir Book" panose="02000503020000020003" pitchFamily="2" charset="0"/>
-              <a:ea typeface="Times New Roman"/>
-              <a:cs typeface="Times New Roman"/>
-              <a:sym typeface="Times New Roman"/>
-            </a:endParaRPr>
-          </a:p>
-        </p:txBody>
-      </p:sp>
-      <p:cxnSp>
-        <p:nvCxnSpPr>
-          <p:cNvPr id="1106" name="Google Shape;1106;p27"/>
-          <p:cNvCxnSpPr/>
-          <p:nvPr/>
-        </p:nvCxnSpPr>
-        <p:spPr>
-          <a:xfrm>
-            <a:off x="214818" y="3961225"/>
-            <a:ext cx="78600" cy="0"/>
-          </a:xfrm>
-          <a:prstGeom prst="straightConnector1">
-            <a:avLst/>
-          </a:prstGeom>
-          <a:noFill/>
-          <a:ln w="9525" cap="flat" cmpd="sng">
-            <a:solidFill>
-              <a:schemeClr val="dk2"/>
-            </a:solidFill>
-            <a:prstDash val="solid"/>
-            <a:round/>
-            <a:headEnd type="none" w="med" len="med"/>
-            <a:tailEnd type="none" w="med" len="med"/>
-          </a:ln>
-        </p:spPr>
-      </p:cxnSp>
+              </a:endParaRPr>
+            </a:p>
+          </p:txBody>
+        </p:sp>
+        <p:cxnSp>
+          <p:nvCxnSpPr>
+            <p:cNvPr id="1106" name="Google Shape;1106;p27"/>
+            <p:cNvCxnSpPr/>
+            <p:nvPr/>
+          </p:nvCxnSpPr>
+          <p:spPr>
+            <a:xfrm>
+              <a:off x="214818" y="3961225"/>
+              <a:ext cx="78600" cy="0"/>
+            </a:xfrm>
+            <a:prstGeom prst="straightConnector1">
+              <a:avLst/>
+            </a:prstGeom>
+            <a:noFill/>
+            <a:ln w="9525" cap="flat" cmpd="sng">
+              <a:solidFill>
+                <a:schemeClr val="dk2"/>
+              </a:solidFill>
+              <a:prstDash val="solid"/>
+              <a:round/>
+              <a:headEnd type="none" w="med" len="med"/>
+              <a:tailEnd type="none" w="med" len="med"/>
+            </a:ln>
+          </p:spPr>
+        </p:cxnSp>
+      </p:grpSp>
       <p:cxnSp>
         <p:nvCxnSpPr>
           <p:cNvPr id="1107" name="Google Shape;1107;p27"/>
@@ -10636,13 +10741,14 @@
           </p:cNvPr>
           <p:cNvCxnSpPr>
             <a:cxnSpLocks/>
+            <a:endCxn id="1086" idx="2"/>
           </p:cNvCxnSpPr>
           <p:nvPr/>
         </p:nvCxnSpPr>
         <p:spPr>
           <a:xfrm flipV="1">
-            <a:off x="3037963" y="3303620"/>
-            <a:ext cx="3209206" cy="452106"/>
+            <a:off x="3037963" y="3369625"/>
+            <a:ext cx="3208612" cy="386102"/>
           </a:xfrm>
           <a:prstGeom prst="bentConnector2">
             <a:avLst/>
@@ -10675,12 +10781,12 @@
         </p:nvCxnSpPr>
         <p:spPr>
           <a:xfrm flipV="1">
-            <a:off x="3139775" y="3310576"/>
-            <a:ext cx="2681943" cy="533349"/>
+            <a:off x="3139775" y="3387910"/>
+            <a:ext cx="2693466" cy="456016"/>
           </a:xfrm>
           <a:prstGeom prst="bentConnector3">
             <a:avLst>
-              <a:gd name="adj1" fmla="val 100024"/>
+              <a:gd name="adj1" fmla="val 99948"/>
             </a:avLst>
           </a:prstGeom>
           <a:noFill/>
@@ -10695,6 +10801,189 @@
           </a:ln>
         </p:spPr>
       </p:cxnSp>
+      <p:grpSp>
+        <p:nvGrpSpPr>
+          <p:cNvPr id="5" name="Group 4">
+            <a:extLst>
+              <a:ext uri="{FF2B5EF4-FFF2-40B4-BE49-F238E27FC236}">
+                <a16:creationId xmlns:a16="http://schemas.microsoft.com/office/drawing/2014/main" id="{B9E8CAD1-728B-E749-A238-F4C20DF550E2}"/>
+              </a:ext>
+            </a:extLst>
+          </p:cNvPr>
+          <p:cNvGrpSpPr/>
+          <p:nvPr/>
+        </p:nvGrpSpPr>
+        <p:grpSpPr>
+          <a:xfrm>
+            <a:off x="-147944" y="296186"/>
+            <a:ext cx="480000" cy="157500"/>
+            <a:chOff x="-147944" y="324467"/>
+            <a:chExt cx="480000" cy="157500"/>
+          </a:xfrm>
+        </p:grpSpPr>
+        <p:sp>
+          <p:nvSpPr>
+            <p:cNvPr id="92" name="Google Shape;1097;p27">
+              <a:extLst>
+                <a:ext uri="{FF2B5EF4-FFF2-40B4-BE49-F238E27FC236}">
+                  <a16:creationId xmlns:a16="http://schemas.microsoft.com/office/drawing/2014/main" id="{EB4A642B-9146-4B47-B685-769A979F123F}"/>
+                </a:ext>
+              </a:extLst>
+            </p:cNvPr>
+            <p:cNvSpPr/>
+            <p:nvPr/>
+          </p:nvSpPr>
+          <p:spPr>
+            <a:xfrm>
+              <a:off x="-147944" y="324467"/>
+              <a:ext cx="480000" cy="157500"/>
+            </a:xfrm>
+            <a:prstGeom prst="roundRect">
+              <a:avLst>
+                <a:gd name="adj" fmla="val 16667"/>
+              </a:avLst>
+            </a:prstGeom>
+            <a:noFill/>
+            <a:ln>
+              <a:noFill/>
+            </a:ln>
+          </p:spPr>
+          <p:txBody>
+            <a:bodyPr spcFirstLastPara="1" wrap="square" lIns="0" tIns="91425" rIns="0" bIns="91425" anchor="ctr" anchorCtr="0">
+              <a:noAutofit/>
+            </a:bodyPr>
+            <a:lstStyle/>
+            <a:p>
+              <a:pPr marL="0" marR="0" lvl="0" indent="0" algn="ctr" rtl="0">
+                <a:lnSpc>
+                  <a:spcPct val="100000"/>
+                </a:lnSpc>
+                <a:spcBef>
+                  <a:spcPts val="0"/>
+                </a:spcBef>
+                <a:spcAft>
+                  <a:spcPts val="0"/>
+                </a:spcAft>
+                <a:buNone/>
+              </a:pPr>
+              <a:r>
+                <a:rPr lang="en" sz="1200" dirty="0">
+                  <a:latin typeface="Avenir Book" panose="02000503020000020003" pitchFamily="2" charset="0"/>
+                  <a:ea typeface="Times New Roman"/>
+                  <a:cs typeface="Times New Roman"/>
+                  <a:sym typeface="Times New Roman"/>
+                </a:rPr>
+                <a:t>60</a:t>
+              </a:r>
+              <a:endParaRPr sz="1200" dirty="0">
+                <a:latin typeface="Avenir Book" panose="02000503020000020003" pitchFamily="2" charset="0"/>
+                <a:ea typeface="Times New Roman"/>
+                <a:cs typeface="Times New Roman"/>
+                <a:sym typeface="Times New Roman"/>
+              </a:endParaRPr>
+            </a:p>
+          </p:txBody>
+        </p:sp>
+        <p:cxnSp>
+          <p:nvCxnSpPr>
+            <p:cNvPr id="93" name="Google Shape;1098;p27">
+              <a:extLst>
+                <a:ext uri="{FF2B5EF4-FFF2-40B4-BE49-F238E27FC236}">
+                  <a16:creationId xmlns:a16="http://schemas.microsoft.com/office/drawing/2014/main" id="{1DAE5CFE-AE33-FA46-B1BA-2B99402BBCFD}"/>
+                </a:ext>
+              </a:extLst>
+            </p:cNvPr>
+            <p:cNvCxnSpPr/>
+            <p:nvPr/>
+          </p:nvCxnSpPr>
+          <p:spPr>
+            <a:xfrm>
+              <a:off x="214818" y="403217"/>
+              <a:ext cx="78600" cy="0"/>
+            </a:xfrm>
+            <a:prstGeom prst="straightConnector1">
+              <a:avLst/>
+            </a:prstGeom>
+            <a:noFill/>
+            <a:ln w="9525" cap="flat" cmpd="sng">
+              <a:solidFill>
+                <a:schemeClr val="dk2"/>
+              </a:solidFill>
+              <a:prstDash val="solid"/>
+              <a:round/>
+              <a:headEnd type="none" w="med" len="med"/>
+              <a:tailEnd type="none" w="med" len="med"/>
+            </a:ln>
+          </p:spPr>
+        </p:cxnSp>
+      </p:grpSp>
+      <p:sp>
+        <p:nvSpPr>
+          <p:cNvPr id="101" name="Google Shape;1118;p27">
+            <a:extLst>
+              <a:ext uri="{FF2B5EF4-FFF2-40B4-BE49-F238E27FC236}">
+                <a16:creationId xmlns:a16="http://schemas.microsoft.com/office/drawing/2014/main" id="{06E33473-0D4E-8446-B459-C43E4AD157D0}"/>
+              </a:ext>
+            </a:extLst>
+          </p:cNvPr>
+          <p:cNvSpPr txBox="1"/>
+          <p:nvPr/>
+        </p:nvSpPr>
+        <p:spPr>
+          <a:xfrm>
+            <a:off x="5393300" y="2720368"/>
+            <a:ext cx="800396" cy="212366"/>
+          </a:xfrm>
+          <a:prstGeom prst="rect">
+            <a:avLst/>
+          </a:prstGeom>
+          <a:noFill/>
+          <a:ln>
+            <a:noFill/>
+          </a:ln>
+        </p:spPr>
+        <p:txBody>
+          <a:bodyPr spcFirstLastPara="1" wrap="square" lIns="0" tIns="0" rIns="0" bIns="0" anchor="t" anchorCtr="0">
+            <a:spAutoFit/>
+          </a:bodyPr>
+          <a:lstStyle/>
+          <a:p>
+            <a:pPr marL="0" lvl="0" indent="0" algn="ctr" rtl="0">
+              <a:lnSpc>
+                <a:spcPct val="115000"/>
+              </a:lnSpc>
+              <a:spcBef>
+                <a:spcPts val="0"/>
+              </a:spcBef>
+              <a:spcAft>
+                <a:spcPts val="0"/>
+              </a:spcAft>
+              <a:buNone/>
+            </a:pPr>
+            <a:r>
+              <a:rPr lang="en" sz="1200" b="1" dirty="0">
+                <a:solidFill>
+                  <a:schemeClr val="accent1"/>
+                </a:solidFill>
+                <a:latin typeface="Avenir"/>
+                <a:ea typeface="Avenir"/>
+                <a:cs typeface="Avenir"/>
+                <a:sym typeface="Avenir"/>
+              </a:rPr>
+              <a:t>Visibility ID</a:t>
+            </a:r>
+            <a:endParaRPr sz="1200" b="1" dirty="0">
+              <a:solidFill>
+                <a:schemeClr val="accent1"/>
+              </a:solidFill>
+              <a:latin typeface="Avenir"/>
+              <a:ea typeface="Avenir"/>
+              <a:cs typeface="Avenir"/>
+              <a:sym typeface="Avenir"/>
+            </a:endParaRPr>
+          </a:p>
+        </p:txBody>
+      </p:sp>
     </p:spTree>
   </p:cSld>
   <p:clrMapOvr>

</xml_diff>